<commit_message>
Updating Beyond Legacy Code Part I
</commit_message>
<xml_diff>
--- a/books/BeyondLegacyCode-TL;DR.pptx
+++ b/books/BeyondLegacyCode-TL;DR.pptx
@@ -5,12 +5,14 @@
     <p:sldMasterId id="2147483648" r:id="rId1"/>
   </p:sldMasterIdLst>
   <p:notesMasterIdLst>
-    <p:notesMasterId r:id="rId5"/>
+    <p:notesMasterId r:id="rId7"/>
   </p:notesMasterIdLst>
   <p:sldIdLst>
     <p:sldId id="256" r:id="rId2"/>
     <p:sldId id="257" r:id="rId3"/>
     <p:sldId id="258" r:id="rId4"/>
+    <p:sldId id="259" r:id="rId5"/>
+    <p:sldId id="260" r:id="rId6"/>
   </p:sldIdLst>
   <p:sldSz cx="12192000" cy="6858000"/>
   <p:notesSz cx="6858000" cy="9144000"/>
@@ -109,6 +111,11 @@
       </a:defRPr>
     </a:lvl9pPr>
   </p:defaultTextStyle>
+  <p:extLst>
+    <p:ext uri="{EFAFB233-063F-42B5-8137-9DF3F51BA10A}">
+      <p15:sldGuideLst xmlns:p15="http://schemas.microsoft.com/office/powerpoint/2012/main"/>
+    </p:ext>
+  </p:extLst>
 </p:presentation>
 </file>
 
@@ -697,6 +704,427 @@
     <p:extLst>
       <p:ext uri="{BB962C8B-B14F-4D97-AF65-F5344CB8AC3E}">
         <p14:creationId xmlns:p14="http://schemas.microsoft.com/office/powerpoint/2010/main" val="1516412303"/>
+      </p:ext>
+    </p:extLst>
+  </p:cSld>
+  <p:clrMapOvr>
+    <a:masterClrMapping/>
+  </p:clrMapOvr>
+</p:notes>
+</file>
+
+<file path=ppt/notesSlides/notesSlide3.xml><?xml version="1.0" encoding="utf-8"?>
+<p:notes xmlns:a="http://schemas.openxmlformats.org/drawingml/2006/main" xmlns:r="http://schemas.openxmlformats.org/officeDocument/2006/relationships" xmlns:p="http://schemas.openxmlformats.org/presentationml/2006/main">
+  <p:cSld>
+    <p:spTree>
+      <p:nvGrpSpPr>
+        <p:cNvPr id="1" name=""/>
+        <p:cNvGrpSpPr/>
+        <p:nvPr/>
+      </p:nvGrpSpPr>
+      <p:grpSpPr>
+        <a:xfrm>
+          <a:off x="0" y="0"/>
+          <a:ext cx="0" cy="0"/>
+          <a:chOff x="0" y="0"/>
+          <a:chExt cx="0" cy="0"/>
+        </a:xfrm>
+      </p:grpSpPr>
+      <p:sp>
+        <p:nvSpPr>
+          <p:cNvPr id="2" name="Slide Image Placeholder 1"/>
+          <p:cNvSpPr>
+            <a:spLocks noGrp="1" noRot="1" noChangeAspect="1"/>
+          </p:cNvSpPr>
+          <p:nvPr>
+            <p:ph type="sldImg"/>
+          </p:nvPr>
+        </p:nvSpPr>
+        <p:spPr/>
+      </p:sp>
+      <p:sp>
+        <p:nvSpPr>
+          <p:cNvPr id="3" name="Notes Placeholder 2"/>
+          <p:cNvSpPr>
+            <a:spLocks noGrp="1"/>
+          </p:cNvSpPr>
+          <p:nvPr>
+            <p:ph type="body" idx="1"/>
+          </p:nvPr>
+        </p:nvSpPr>
+        <p:spPr/>
+        <p:txBody>
+          <a:bodyPr/>
+          <a:lstStyle/>
+          <a:p>
+            <a:pPr marL="228600" indent="-228600">
+              <a:buAutoNum type="arabicPeriod"/>
+            </a:pPr>
+            <a:r>
+              <a:rPr lang="en-US" dirty="0"/>
+              <a:t>Code </a:t>
+            </a:r>
+            <a:r>
+              <a:rPr lang="en-US" dirty="0" err="1"/>
+              <a:t>Mokey</a:t>
+            </a:r>
+            <a:r>
+              <a:rPr lang="en-US" dirty="0"/>
+              <a:t>-ness: Based on recent example I can say the </a:t>
+            </a:r>
+            <a:r>
+              <a:rPr lang="en-US" b="1" dirty="0"/>
+              <a:t>internal </a:t>
+            </a:r>
+            <a:r>
+              <a:rPr lang="en-US" b="1" dirty="0" err="1"/>
+              <a:t>oauth</a:t>
+            </a:r>
+            <a:r>
+              <a:rPr lang="en-US" b="0" dirty="0"/>
+              <a:t> </a:t>
+            </a:r>
+            <a:r>
+              <a:rPr lang="en-US" b="1" dirty="0"/>
+              <a:t>with </a:t>
+            </a:r>
+            <a:r>
+              <a:rPr lang="en-US" b="1" dirty="0" err="1"/>
+              <a:t>jwt</a:t>
+            </a:r>
+            <a:r>
+              <a:rPr lang="en-US" b="1" dirty="0"/>
+              <a:t> assertion</a:t>
+            </a:r>
+            <a:r>
+              <a:rPr lang="en-US" b="0" dirty="0"/>
+              <a:t> developed by our organization without thinking how it affects the consumers. </a:t>
+            </a:r>
+          </a:p>
+          <a:p>
+            <a:pPr marL="228600" indent="-228600">
+              <a:buAutoNum type="arabicPeriod"/>
+            </a:pPr>
+            <a:r>
+              <a:rPr lang="en-US" b="0" dirty="0"/>
+              <a:t>Software Archaeology : Code with no documentation, poorly named artifacts like variables classes and gives a feeling like archaeologist trying to figure out how ancient developer would have though of this project. </a:t>
+            </a:r>
+          </a:p>
+          <a:p>
+            <a:pPr marL="228600" indent="-228600">
+              <a:buAutoNum type="arabicPeriod"/>
+            </a:pPr>
+            <a:r>
+              <a:rPr lang="en-US" b="0" dirty="0"/>
+              <a:t>Michael Feathers in </a:t>
+            </a:r>
+            <a:r>
+              <a:rPr lang="en-US" b="1" i="1" dirty="0"/>
+              <a:t>Working with Legacy Code </a:t>
+            </a:r>
+            <a:endParaRPr lang="en-US" b="0" i="0" dirty="0"/>
+          </a:p>
+          <a:p>
+            <a:pPr marL="228600" indent="-228600">
+              <a:buAutoNum type="arabicPeriod"/>
+            </a:pPr>
+            <a:r>
+              <a:rPr lang="en-US" b="0" i="0" dirty="0"/>
+              <a:t>Book also talked about what was the WATERFALL model / approach – Requirements, Design, Implementation, Integration, Testing, Installation and Maintenance – in that very specific order! </a:t>
+            </a:r>
+          </a:p>
+          <a:p>
+            <a:pPr marL="685800" lvl="1" indent="-228600">
+              <a:buAutoNum type="arabicPeriod"/>
+            </a:pPr>
+            <a:r>
+              <a:rPr lang="en-US" b="0" i="0" dirty="0"/>
+              <a:t>If you want to understand it came as is because of experience of manufacturing industry</a:t>
+            </a:r>
+          </a:p>
+          <a:p>
+            <a:pPr marL="685800" lvl="1" indent="-228600">
+              <a:buAutoNum type="arabicPeriod"/>
+            </a:pPr>
+            <a:r>
+              <a:rPr lang="en-US" b="0" i="0" dirty="0"/>
+              <a:t>But the challenge was software is not assembling of pre-fabricated/manufacture pieces in always the same right order.</a:t>
+            </a:r>
+          </a:p>
+          <a:p>
+            <a:pPr marL="685800" lvl="1" indent="-228600">
+              <a:buAutoNum type="arabicPeriod"/>
+            </a:pPr>
+            <a:r>
+              <a:rPr lang="en-US" b="0" i="0" dirty="0"/>
+              <a:t>Eventually the model started to see challenges like i2m just too long</a:t>
+            </a:r>
+          </a:p>
+          <a:p>
+            <a:pPr marL="685800" lvl="1" indent="-228600">
+              <a:buAutoNum type="arabicPeriod"/>
+            </a:pPr>
+            <a:r>
+              <a:rPr lang="en-US" b="0" i="0" dirty="0"/>
+              <a:t>Comparing this from building a house – blueprint, built but not added a room in between or after construction where as how many new features get added before software is done completely?</a:t>
+            </a:r>
+          </a:p>
+          <a:p>
+            <a:pPr marL="228600" indent="-228600">
+              <a:buAutoNum type="arabicPeriod"/>
+            </a:pPr>
+            <a:r>
+              <a:rPr lang="en-US" b="0" dirty="0"/>
+              <a:t>One of the aspect of Waterfall is about Integration is put off to the late; considering the experience of encryption @ rest, having isolated stories being developed didn’t make sense. May be from the failures of waterfall we should always think about integration should be quicker than later. </a:t>
+            </a:r>
+          </a:p>
+          <a:p>
+            <a:pPr marL="228600" indent="-228600">
+              <a:buAutoNum type="arabicPeriod"/>
+            </a:pPr>
+            <a:endParaRPr lang="en-US" b="0" dirty="0"/>
+          </a:p>
+          <a:p>
+            <a:pPr marL="228600" indent="-228600">
+              <a:buAutoNum type="arabicPeriod"/>
+            </a:pPr>
+            <a:endParaRPr lang="en-US" dirty="0"/>
+          </a:p>
+        </p:txBody>
+      </p:sp>
+      <p:sp>
+        <p:nvSpPr>
+          <p:cNvPr id="4" name="Slide Number Placeholder 3"/>
+          <p:cNvSpPr>
+            <a:spLocks noGrp="1"/>
+          </p:cNvSpPr>
+          <p:nvPr>
+            <p:ph type="sldNum" sz="quarter" idx="5"/>
+          </p:nvPr>
+        </p:nvSpPr>
+        <p:spPr/>
+        <p:txBody>
+          <a:bodyPr/>
+          <a:lstStyle/>
+          <a:p>
+            <a:fld id="{6D623CD2-E670-1845-8957-32C850F8F83D}" type="slidenum">
+              <a:rPr lang="en-US" smtClean="0"/>
+              <a:t>4</a:t>
+            </a:fld>
+            <a:endParaRPr lang="en-US"/>
+          </a:p>
+        </p:txBody>
+      </p:sp>
+    </p:spTree>
+    <p:extLst>
+      <p:ext uri="{BB962C8B-B14F-4D97-AF65-F5344CB8AC3E}">
+        <p14:creationId xmlns:p14="http://schemas.microsoft.com/office/powerpoint/2010/main" val="2537466961"/>
+      </p:ext>
+    </p:extLst>
+  </p:cSld>
+  <p:clrMapOvr>
+    <a:masterClrMapping/>
+  </p:clrMapOvr>
+</p:notes>
+</file>
+
+<file path=ppt/notesSlides/notesSlide4.xml><?xml version="1.0" encoding="utf-8"?>
+<p:notes xmlns:a="http://schemas.openxmlformats.org/drawingml/2006/main" xmlns:r="http://schemas.openxmlformats.org/officeDocument/2006/relationships" xmlns:p="http://schemas.openxmlformats.org/presentationml/2006/main">
+  <p:cSld>
+    <p:spTree>
+      <p:nvGrpSpPr>
+        <p:cNvPr id="1" name=""/>
+        <p:cNvGrpSpPr/>
+        <p:nvPr/>
+      </p:nvGrpSpPr>
+      <p:grpSpPr>
+        <a:xfrm>
+          <a:off x="0" y="0"/>
+          <a:ext cx="0" cy="0"/>
+          <a:chOff x="0" y="0"/>
+          <a:chExt cx="0" cy="0"/>
+        </a:xfrm>
+      </p:grpSpPr>
+      <p:sp>
+        <p:nvSpPr>
+          <p:cNvPr id="2" name="Slide Image Placeholder 1"/>
+          <p:cNvSpPr>
+            <a:spLocks noGrp="1" noRot="1" noChangeAspect="1"/>
+          </p:cNvSpPr>
+          <p:nvPr>
+            <p:ph type="sldImg"/>
+          </p:nvPr>
+        </p:nvSpPr>
+        <p:spPr/>
+      </p:sp>
+      <p:sp>
+        <p:nvSpPr>
+          <p:cNvPr id="3" name="Notes Placeholder 2"/>
+          <p:cNvSpPr>
+            <a:spLocks noGrp="1"/>
+          </p:cNvSpPr>
+          <p:nvPr>
+            <p:ph type="body" idx="1"/>
+          </p:nvPr>
+        </p:nvSpPr>
+        <p:spPr/>
+        <p:txBody>
+          <a:bodyPr/>
+          <a:lstStyle/>
+          <a:p>
+            <a:r>
+              <a:rPr lang="en-US" dirty="0"/>
+              <a:t>* This is my interpretation of the author and feel free to read </a:t>
+            </a:r>
+            <a:r>
+              <a:rPr lang="en-US" b="1" dirty="0"/>
+              <a:t>When “Process” becomes “Busy” work</a:t>
+            </a:r>
+            <a:r>
+              <a:rPr lang="en-US" dirty="0"/>
+              <a:t> chapter to understand it further yourself. </a:t>
+            </a:r>
+          </a:p>
+          <a:p>
+            <a:pPr marL="628650" lvl="1" indent="-171450">
+              <a:buFontTx/>
+              <a:buChar char="-"/>
+            </a:pPr>
+            <a:r>
+              <a:rPr lang="en-US" dirty="0"/>
+              <a:t>I feel disengage because in our current organization, so much is happening without our involvement or even if we are involved, have absolutely no influence – we are reaching state of disengagement</a:t>
+            </a:r>
+          </a:p>
+          <a:p>
+            <a:pPr marL="628650" lvl="1" indent="-171450">
+              <a:buFontTx/>
+              <a:buChar char="-"/>
+            </a:pPr>
+            <a:r>
+              <a:rPr lang="en-US" dirty="0"/>
+              <a:t>And yes it feels like disrespectful that the company aren’t caring for some of the talent. </a:t>
+            </a:r>
+          </a:p>
+          <a:p>
+            <a:pPr marL="171450" lvl="0" indent="-171450">
+              <a:buFont typeface="Arial" panose="020B0604020202020204" pitchFamily="34" charset="0"/>
+              <a:buChar char="•"/>
+            </a:pPr>
+            <a:r>
+              <a:rPr lang="en-US" dirty="0"/>
+              <a:t>Here Be Dragons</a:t>
+            </a:r>
+          </a:p>
+          <a:p>
+            <a:pPr marL="457200" lvl="1" indent="0" algn="l">
+              <a:buFont typeface="Arial" panose="020B0604020202020204" pitchFamily="34" charset="0"/>
+              <a:buNone/>
+            </a:pPr>
+            <a:r>
+              <a:rPr lang="en-US" dirty="0"/>
+              <a:t>- Guestimates… developers really do not have idea how much is pending!</a:t>
+            </a:r>
+          </a:p>
+          <a:p>
+            <a:pPr marL="628650" lvl="1" indent="-171450" algn="l">
+              <a:buFontTx/>
+              <a:buChar char="-"/>
+            </a:pPr>
+            <a:r>
+              <a:rPr lang="en-US" dirty="0"/>
+              <a:t>Developers three states “Finished”, “Not yet started”, “almost done”</a:t>
+            </a:r>
+          </a:p>
+          <a:p>
+            <a:pPr marL="171450" lvl="0" indent="-171450" algn="l">
+              <a:buFontTx/>
+              <a:buChar char="-"/>
+            </a:pPr>
+            <a:r>
+              <a:rPr lang="en-US" dirty="0"/>
+              <a:t>Estimates Unknowns: I am not sure if the author meant that design documents aren’t that useful vs design documents are useful for us/ourself to understand what customer needs?</a:t>
+            </a:r>
+          </a:p>
+          <a:p>
+            <a:pPr marL="171450" lvl="0" indent="-171450" algn="l">
+              <a:buFontTx/>
+              <a:buChar char="-"/>
+            </a:pPr>
+            <a:r>
+              <a:rPr lang="en-US" dirty="0"/>
+              <a:t>Industry of </a:t>
+            </a:r>
+            <a:r>
+              <a:rPr lang="en-US" dirty="0" err="1"/>
+              <a:t>Amatures</a:t>
+            </a:r>
+            <a:r>
+              <a:rPr lang="en-US" dirty="0"/>
+              <a:t>: </a:t>
+            </a:r>
+          </a:p>
+          <a:p>
+            <a:pPr marL="628650" lvl="1" indent="-171450" algn="l">
+              <a:buFontTx/>
+              <a:buChar char="-"/>
+            </a:pPr>
+            <a:r>
+              <a:rPr lang="en-US" dirty="0"/>
+              <a:t>Civil </a:t>
+            </a:r>
+            <a:r>
+              <a:rPr lang="en-US" dirty="0" err="1"/>
+              <a:t>Engg</a:t>
+            </a:r>
+            <a:r>
+              <a:rPr lang="en-US" dirty="0"/>
+              <a:t> is concrete vs Software dev is abstract</a:t>
+            </a:r>
+          </a:p>
+          <a:p>
+            <a:pPr marL="628650" lvl="1" indent="-171450" algn="l">
+              <a:buFontTx/>
+              <a:buChar char="-"/>
+            </a:pPr>
+            <a:r>
+              <a:rPr lang="en-US" dirty="0"/>
+              <a:t>Hippocrates defined medicine as “Do No Harm”, for software we have no guide to make good choices (only </a:t>
+            </a:r>
+            <a:r>
+              <a:rPr lang="en-US"/>
+              <a:t>past experiences) </a:t>
+            </a:r>
+            <a:endParaRPr lang="en-US" dirty="0"/>
+          </a:p>
+        </p:txBody>
+      </p:sp>
+      <p:sp>
+        <p:nvSpPr>
+          <p:cNvPr id="4" name="Slide Number Placeholder 3"/>
+          <p:cNvSpPr>
+            <a:spLocks noGrp="1"/>
+          </p:cNvSpPr>
+          <p:nvPr>
+            <p:ph type="sldNum" sz="quarter" idx="5"/>
+          </p:nvPr>
+        </p:nvSpPr>
+        <p:spPr/>
+        <p:txBody>
+          <a:bodyPr/>
+          <a:lstStyle/>
+          <a:p>
+            <a:fld id="{6D623CD2-E670-1845-8957-32C850F8F83D}" type="slidenum">
+              <a:rPr lang="en-US" smtClean="0"/>
+              <a:t>5</a:t>
+            </a:fld>
+            <a:endParaRPr lang="en-US"/>
+          </a:p>
+        </p:txBody>
+      </p:sp>
+    </p:spTree>
+    <p:extLst>
+      <p:ext uri="{BB962C8B-B14F-4D97-AF65-F5344CB8AC3E}">
+        <p14:creationId xmlns:p14="http://schemas.microsoft.com/office/powerpoint/2010/main" val="4169312559"/>
       </p:ext>
     </p:extLst>
   </p:cSld>
@@ -6580,6 +7008,306 @@
     <p:extLst>
       <p:ext uri="{BB962C8B-B14F-4D97-AF65-F5344CB8AC3E}">
         <p14:creationId xmlns:p14="http://schemas.microsoft.com/office/powerpoint/2010/main" val="123717716"/>
+      </p:ext>
+    </p:extLst>
+  </p:cSld>
+  <p:clrMapOvr>
+    <a:masterClrMapping/>
+  </p:clrMapOvr>
+</p:sld>
+</file>
+
+<file path=ppt/slides/slide4.xml><?xml version="1.0" encoding="utf-8"?>
+<p:sld xmlns:a="http://schemas.openxmlformats.org/drawingml/2006/main" xmlns:r="http://schemas.openxmlformats.org/officeDocument/2006/relationships" xmlns:p="http://schemas.openxmlformats.org/presentationml/2006/main">
+  <p:cSld>
+    <p:spTree>
+      <p:nvGrpSpPr>
+        <p:cNvPr id="1" name=""/>
+        <p:cNvGrpSpPr/>
+        <p:nvPr/>
+      </p:nvGrpSpPr>
+      <p:grpSpPr>
+        <a:xfrm>
+          <a:off x="0" y="0"/>
+          <a:ext cx="0" cy="0"/>
+          <a:chOff x="0" y="0"/>
+          <a:chExt cx="0" cy="0"/>
+        </a:xfrm>
+      </p:grpSpPr>
+      <p:sp>
+        <p:nvSpPr>
+          <p:cNvPr id="2" name="Title 1">
+            <a:extLst>
+              <a:ext uri="{FF2B5EF4-FFF2-40B4-BE49-F238E27FC236}">
+                <a16:creationId xmlns:a16="http://schemas.microsoft.com/office/drawing/2014/main" id="{463F2ED5-D96C-A241-BEC1-7B0C1D81DC2E}"/>
+              </a:ext>
+            </a:extLst>
+          </p:cNvPr>
+          <p:cNvSpPr>
+            <a:spLocks noGrp="1"/>
+          </p:cNvSpPr>
+          <p:nvPr>
+            <p:ph type="title"/>
+          </p:nvPr>
+        </p:nvSpPr>
+        <p:spPr/>
+        <p:txBody>
+          <a:bodyPr/>
+          <a:lstStyle/>
+          <a:p>
+            <a:r>
+              <a:rPr lang="en-US" dirty="0"/>
+              <a:t>Part I: The legacy code crisis</a:t>
+            </a:r>
+          </a:p>
+        </p:txBody>
+      </p:sp>
+      <p:sp>
+        <p:nvSpPr>
+          <p:cNvPr id="3" name="Content Placeholder 2">
+            <a:extLst>
+              <a:ext uri="{FF2B5EF4-FFF2-40B4-BE49-F238E27FC236}">
+                <a16:creationId xmlns:a16="http://schemas.microsoft.com/office/drawing/2014/main" id="{8E3518D8-AC95-164A-9842-FE81604EFAE9}"/>
+              </a:ext>
+            </a:extLst>
+          </p:cNvPr>
+          <p:cNvSpPr>
+            <a:spLocks noGrp="1"/>
+          </p:cNvSpPr>
+          <p:nvPr>
+            <p:ph idx="1"/>
+          </p:nvPr>
+        </p:nvSpPr>
+        <p:spPr/>
+        <p:txBody>
+          <a:bodyPr>
+            <a:normAutofit/>
+          </a:bodyPr>
+          <a:lstStyle/>
+          <a:p>
+            <a:pPr marL="0" indent="0">
+              <a:buNone/>
+            </a:pPr>
+            <a:r>
+              <a:rPr lang="en-US" dirty="0"/>
+              <a:t>True example of organization with experienced, smart professionals</a:t>
+            </a:r>
+          </a:p>
+          <a:p>
+            <a:r>
+              <a:rPr lang="en-US" dirty="0"/>
+              <a:t>Code monkey-ness: Micro-focused on building “just this feature”</a:t>
+            </a:r>
+          </a:p>
+          <a:p>
+            <a:r>
+              <a:rPr lang="en-US" dirty="0"/>
+              <a:t>Deadlines slips, More processes added, Eroded trust further. </a:t>
+            </a:r>
+          </a:p>
+          <a:p>
+            <a:r>
+              <a:rPr lang="en-US" dirty="0"/>
+              <a:t>Relationship between QA, Dev and Operations? </a:t>
+            </a:r>
+          </a:p>
+          <a:p>
+            <a:r>
+              <a:rPr lang="en-US" dirty="0"/>
+              <a:t>From there to “People began to care”</a:t>
+            </a:r>
+          </a:p>
+          <a:p>
+            <a:pPr marL="0" indent="0">
+              <a:buNone/>
+            </a:pPr>
+            <a:endParaRPr lang="en-US" dirty="0"/>
+          </a:p>
+          <a:p>
+            <a:pPr marL="0" indent="0">
+              <a:buNone/>
+            </a:pPr>
+            <a:r>
+              <a:rPr lang="en-US" dirty="0"/>
+              <a:t>What is legacy Code</a:t>
+            </a:r>
+          </a:p>
+          <a:p>
+            <a:r>
+              <a:rPr lang="en-US" dirty="0"/>
+              <a:t>Requires “Software Archaeology”</a:t>
+            </a:r>
+          </a:p>
+          <a:p>
+            <a:r>
+              <a:rPr lang="en-US" dirty="0"/>
+              <a:t>Michael Feathers: any code with no unit test case (even newly written code)</a:t>
+            </a:r>
+          </a:p>
+          <a:p>
+            <a:pPr marL="0" indent="0">
+              <a:buNone/>
+            </a:pPr>
+            <a:endParaRPr lang="en-US" dirty="0"/>
+          </a:p>
+        </p:txBody>
+      </p:sp>
+    </p:spTree>
+    <p:extLst>
+      <p:ext uri="{BB962C8B-B14F-4D97-AF65-F5344CB8AC3E}">
+        <p14:creationId xmlns:p14="http://schemas.microsoft.com/office/powerpoint/2010/main" val="3303553930"/>
+      </p:ext>
+    </p:extLst>
+  </p:cSld>
+  <p:clrMapOvr>
+    <a:masterClrMapping/>
+  </p:clrMapOvr>
+</p:sld>
+</file>
+
+<file path=ppt/slides/slide5.xml><?xml version="1.0" encoding="utf-8"?>
+<p:sld xmlns:a="http://schemas.openxmlformats.org/drawingml/2006/main" xmlns:r="http://schemas.openxmlformats.org/officeDocument/2006/relationships" xmlns:p="http://schemas.openxmlformats.org/presentationml/2006/main">
+  <p:cSld>
+    <p:spTree>
+      <p:nvGrpSpPr>
+        <p:cNvPr id="1" name=""/>
+        <p:cNvGrpSpPr/>
+        <p:nvPr/>
+      </p:nvGrpSpPr>
+      <p:grpSpPr>
+        <a:xfrm>
+          <a:off x="0" y="0"/>
+          <a:ext cx="0" cy="0"/>
+          <a:chOff x="0" y="0"/>
+          <a:chExt cx="0" cy="0"/>
+        </a:xfrm>
+      </p:grpSpPr>
+      <p:sp>
+        <p:nvSpPr>
+          <p:cNvPr id="2" name="Title 1">
+            <a:extLst>
+              <a:ext uri="{FF2B5EF4-FFF2-40B4-BE49-F238E27FC236}">
+                <a16:creationId xmlns:a16="http://schemas.microsoft.com/office/drawing/2014/main" id="{2511D263-75D3-FA4D-AEAC-9A764BD86AE9}"/>
+              </a:ext>
+            </a:extLst>
+          </p:cNvPr>
+          <p:cNvSpPr>
+            <a:spLocks noGrp="1"/>
+          </p:cNvSpPr>
+          <p:nvPr>
+            <p:ph type="title"/>
+          </p:nvPr>
+        </p:nvSpPr>
+        <p:spPr/>
+        <p:txBody>
+          <a:bodyPr/>
+          <a:lstStyle/>
+          <a:p>
+            <a:r>
+              <a:rPr lang="en-US" dirty="0" err="1"/>
+              <a:t>Condt</a:t>
+            </a:r>
+            <a:r>
+              <a:rPr lang="en-US" dirty="0"/>
+              <a:t>…</a:t>
+            </a:r>
+          </a:p>
+        </p:txBody>
+      </p:sp>
+      <p:sp>
+        <p:nvSpPr>
+          <p:cNvPr id="3" name="Content Placeholder 2">
+            <a:extLst>
+              <a:ext uri="{FF2B5EF4-FFF2-40B4-BE49-F238E27FC236}">
+                <a16:creationId xmlns:a16="http://schemas.microsoft.com/office/drawing/2014/main" id="{F8F2884D-FAB4-AE49-83A1-172F208FBDE8}"/>
+              </a:ext>
+            </a:extLst>
+          </p:cNvPr>
+          <p:cNvSpPr>
+            <a:spLocks noGrp="1"/>
+          </p:cNvSpPr>
+          <p:nvPr>
+            <p:ph idx="1"/>
+          </p:nvPr>
+        </p:nvSpPr>
+        <p:spPr/>
+        <p:txBody>
+          <a:bodyPr/>
+          <a:lstStyle/>
+          <a:p>
+            <a:pPr marL="0" indent="0">
+              <a:buNone/>
+            </a:pPr>
+            <a:r>
+              <a:rPr lang="en-US" dirty="0"/>
+              <a:t>Waterfall and quirks! </a:t>
+            </a:r>
+          </a:p>
+          <a:p>
+            <a:r>
+              <a:rPr lang="en-US" dirty="0"/>
+              <a:t>Recipes vs Formula – cook vs baker</a:t>
+            </a:r>
+          </a:p>
+          <a:p>
+            <a:r>
+              <a:rPr lang="en-US" dirty="0"/>
+              <a:t>QA is the angel on my shoulder; I am sloppy</a:t>
+            </a:r>
+          </a:p>
+          <a:p>
+            <a:pPr marL="0" indent="0">
+              <a:buNone/>
+            </a:pPr>
+            <a:endParaRPr lang="en-US" dirty="0"/>
+          </a:p>
+          <a:p>
+            <a:pPr marL="0" indent="0">
+              <a:buNone/>
+            </a:pPr>
+            <a:r>
+              <a:rPr lang="en-US" dirty="0"/>
+              <a:t>Process becomes pain in ****</a:t>
+            </a:r>
+          </a:p>
+          <a:p>
+            <a:r>
+              <a:rPr lang="en-US" dirty="0"/>
+              <a:t>All software development road to hell – paved with good intensions!</a:t>
+            </a:r>
+          </a:p>
+          <a:p>
+            <a:pPr lvl="1"/>
+            <a:r>
+              <a:rPr lang="en-US" dirty="0"/>
+              <a:t>Process is an overhead!</a:t>
+            </a:r>
+          </a:p>
+          <a:p>
+            <a:pPr lvl="1"/>
+            <a:r>
+              <a:rPr lang="en-US" dirty="0"/>
+              <a:t>Engagement = Respect*</a:t>
+            </a:r>
+          </a:p>
+          <a:p>
+            <a:r>
+              <a:rPr lang="en-US" dirty="0"/>
+              <a:t>Process can’t define creativity / doing the right thing or even doing faster?</a:t>
+            </a:r>
+          </a:p>
+          <a:p>
+            <a:pPr marL="457200" lvl="1" indent="0">
+              <a:buNone/>
+            </a:pPr>
+            <a:endParaRPr lang="en-US" dirty="0"/>
+          </a:p>
+        </p:txBody>
+      </p:sp>
+    </p:spTree>
+    <p:extLst>
+      <p:ext uri="{BB962C8B-B14F-4D97-AF65-F5344CB8AC3E}">
+        <p14:creationId xmlns:p14="http://schemas.microsoft.com/office/powerpoint/2010/main" val="3175805662"/>
       </p:ext>
     </p:extLst>
   </p:cSld>

</xml_diff>